<commit_message>
Minor updates for the PWA. Added server URL for the generated client. Updated presentation
</commit_message>
<xml_diff>
--- a/WUG-Blazor-PWA.pptx
+++ b/WUG-Blazor-PWA.pptx
@@ -5,7 +5,7 @@
     <p:sldMasterId id="2147483660" r:id="rId1"/>
   </p:sldMasterIdLst>
   <p:notesMasterIdLst>
-    <p:notesMasterId r:id="rId19"/>
+    <p:notesMasterId r:id="rId20"/>
   </p:notesMasterIdLst>
   <p:sldIdLst>
     <p:sldId id="259" r:id="rId2"/>
@@ -13,18 +13,19 @@
     <p:sldId id="265" r:id="rId4"/>
     <p:sldId id="264" r:id="rId5"/>
     <p:sldId id="278" r:id="rId6"/>
-    <p:sldId id="308" r:id="rId7"/>
-    <p:sldId id="303" r:id="rId8"/>
-    <p:sldId id="304" r:id="rId9"/>
-    <p:sldId id="309" r:id="rId10"/>
-    <p:sldId id="306" r:id="rId11"/>
-    <p:sldId id="310" r:id="rId12"/>
-    <p:sldId id="307" r:id="rId13"/>
-    <p:sldId id="279" r:id="rId14"/>
-    <p:sldId id="301" r:id="rId15"/>
-    <p:sldId id="302" r:id="rId16"/>
-    <p:sldId id="266" r:id="rId17"/>
-    <p:sldId id="258" r:id="rId18"/>
+    <p:sldId id="269" r:id="rId7"/>
+    <p:sldId id="308" r:id="rId8"/>
+    <p:sldId id="303" r:id="rId9"/>
+    <p:sldId id="304" r:id="rId10"/>
+    <p:sldId id="309" r:id="rId11"/>
+    <p:sldId id="306" r:id="rId12"/>
+    <p:sldId id="310" r:id="rId13"/>
+    <p:sldId id="307" r:id="rId14"/>
+    <p:sldId id="279" r:id="rId15"/>
+    <p:sldId id="301" r:id="rId16"/>
+    <p:sldId id="302" r:id="rId17"/>
+    <p:sldId id="266" r:id="rId18"/>
+    <p:sldId id="258" r:id="rId19"/>
   </p:sldIdLst>
   <p:sldSz cx="12192000" cy="6858000"/>
   <p:notesSz cx="6858000" cy="9144000"/>
@@ -213,7 +214,7 @@
           <a:p>
             <a:fld id="{AEDDCBB5-9E8F-4C3C-B3FF-42B56171167A}" type="datetimeFigureOut">
               <a:rPr lang="en-US" smtClean="0"/>
-              <a:t>10/20/2020</a:t>
+              <a:t>4/6/2021</a:t>
             </a:fld>
             <a:endParaRPr lang="en-US"/>
           </a:p>
@@ -555,7 +556,7 @@
                 </a:solidFill>
               </a:rPr>
               <a:pPr/>
-              <a:t>17</a:t>
+              <a:t>18</a:t>
             </a:fld>
             <a:endParaRPr lang="cs-CZ" dirty="0">
               <a:solidFill>
@@ -5821,7 +5822,7 @@
           <p:cNvPr id="2" name="Title 1">
             <a:extLst>
               <a:ext uri="{FF2B5EF4-FFF2-40B4-BE49-F238E27FC236}">
-                <a16:creationId xmlns:a16="http://schemas.microsoft.com/office/drawing/2014/main" id="{AD5BC8F0-DE48-4D5F-B775-3B1F8E42D38C}"/>
+                <a16:creationId xmlns:a16="http://schemas.microsoft.com/office/drawing/2014/main" id="{D16D6AAA-F746-465E-B570-B5B348B292F7}"/>
               </a:ext>
             </a:extLst>
           </p:cNvPr>
@@ -5838,8 +5839,8 @@
           <a:lstStyle/>
           <a:p>
             <a:r>
-              <a:rPr lang="en-US" dirty="0" err="1"/>
-              <a:t>IndexedDB</a:t>
+              <a:rPr lang="en-US" dirty="0"/>
+              <a:t>JavaScript Interoperability</a:t>
             </a:r>
             <a:endParaRPr lang="sk-SK" dirty="0"/>
           </a:p>
@@ -5850,7 +5851,7 @@
           <p:cNvPr id="3" name="Content Placeholder 2">
             <a:extLst>
               <a:ext uri="{FF2B5EF4-FFF2-40B4-BE49-F238E27FC236}">
-                <a16:creationId xmlns:a16="http://schemas.microsoft.com/office/drawing/2014/main" id="{D1370F43-3F88-44E6-9266-5A5570D86E20}"/>
+                <a16:creationId xmlns:a16="http://schemas.microsoft.com/office/drawing/2014/main" id="{84390C19-61A3-4AB6-AE8E-3228A123A11E}"/>
               </a:ext>
             </a:extLst>
           </p:cNvPr>
@@ -5863,90 +5864,455 @@
         </p:nvSpPr>
         <p:spPr/>
         <p:txBody>
-          <a:bodyPr>
-            <a:normAutofit/>
-          </a:bodyPr>
+          <a:bodyPr/>
           <a:lstStyle/>
           <a:p>
             <a:r>
+              <a:rPr lang="en-US" b="1" dirty="0"/>
+              <a:t>[</a:t>
+            </a:r>
+            <a:r>
+              <a:rPr lang="en-US" b="1" dirty="0" err="1"/>
+              <a:t>JSInvokable</a:t>
+            </a:r>
+            <a:r>
+              <a:rPr lang="en-US" b="1" dirty="0"/>
+              <a:t>]</a:t>
+            </a:r>
+            <a:r>
               <a:rPr lang="en-US" dirty="0"/>
-              <a:t>Size limit – depends on browser – but is in 10s or 100s of MBs</a:t>
-            </a:r>
-          </a:p>
-          <a:p>
+              <a:t> attribute – enable calling of method from JavaScript</a:t>
+            </a:r>
+          </a:p>
+          <a:p>
+            <a:pPr lvl="1"/>
+            <a:r>
+              <a:rPr lang="en-US" b="1" dirty="0"/>
+              <a:t>In JavaScript - </a:t>
+            </a:r>
+            <a:r>
+              <a:rPr lang="en-US" b="1" dirty="0" err="1"/>
+              <a:t>interop.invokeMethodAsync</a:t>
+            </a:r>
+            <a:r>
+              <a:rPr lang="en-US" b="1" dirty="0"/>
+              <a:t>()</a:t>
+            </a:r>
+          </a:p>
+          <a:p>
+            <a:pPr lvl="2"/>
+            <a:r>
+              <a:rPr lang="en-US" b="1" dirty="0"/>
+              <a:t>1</a:t>
+            </a:r>
+            <a:r>
+              <a:rPr lang="en-US" b="1" baseline="30000" dirty="0"/>
+              <a:t>st</a:t>
+            </a:r>
+            <a:r>
+              <a:rPr lang="en-US" b="1" dirty="0"/>
+              <a:t> parameter – name of method</a:t>
+            </a:r>
+          </a:p>
+          <a:p>
+            <a:pPr lvl="2"/>
+            <a:r>
+              <a:rPr lang="en-US" b="1" dirty="0"/>
+              <a:t>Other parameters – method parameters</a:t>
+            </a:r>
+          </a:p>
+          <a:p>
+            <a:r>
+              <a:rPr lang="en-US" b="1" dirty="0" err="1"/>
+              <a:t>IJSRuntime</a:t>
+            </a:r>
+            <a:r>
+              <a:rPr lang="en-US" b="1" dirty="0"/>
+              <a:t> – </a:t>
+            </a:r>
             <a:r>
               <a:rPr lang="en-US" dirty="0"/>
-              <a:t>There is already a 3</a:t>
-            </a:r>
-            <a:r>
-              <a:rPr lang="en-US" baseline="30000" dirty="0"/>
-              <a:t>rd</a:t>
+              <a:t>run JavaScript from C# code</a:t>
+            </a:r>
+          </a:p>
+          <a:p>
+            <a:pPr lvl="1"/>
+            <a:r>
+              <a:rPr lang="en-US" dirty="0" err="1"/>
+              <a:t>InvokeVoidAsync</a:t>
             </a:r>
             <a:r>
               <a:rPr lang="en-US" dirty="0"/>
-              <a:t> party implementation for </a:t>
-            </a:r>
+              <a:t>() – no return value expected</a:t>
+            </a:r>
+          </a:p>
+          <a:p>
+            <a:pPr lvl="1"/>
             <a:r>
               <a:rPr lang="en-US" dirty="0" err="1"/>
-              <a:t>Blazor</a:t>
-            </a:r>
-            <a:endParaRPr lang="en-US" dirty="0"/>
-          </a:p>
-          <a:p>
+              <a:t>InvokeAsync</a:t>
+            </a:r>
             <a:r>
               <a:rPr lang="en-US" dirty="0"/>
-              <a:t>Also accessible from service worker</a:t>
-            </a:r>
-          </a:p>
-          <a:p>
-            <a:r>
-              <a:rPr lang="en-US" dirty="0"/>
-              <a:t>More complex than </a:t>
-            </a:r>
-            <a:r>
-              <a:rPr lang="en-US" dirty="0" err="1"/>
-              <a:t>LocalStorage</a:t>
-            </a:r>
-            <a:endParaRPr lang="en-US" dirty="0"/>
-          </a:p>
-          <a:p>
-            <a:pPr lvl="1"/>
-            <a:r>
-              <a:rPr lang="en-US" dirty="0"/>
-              <a:t>Need to take care of updating schema of database on client</a:t>
-            </a:r>
-          </a:p>
-          <a:p>
-            <a:pPr lvl="1"/>
-            <a:r>
-              <a:rPr lang="en-US" dirty="0"/>
-              <a:t>But enables more advanced scenarios</a:t>
-            </a:r>
+              <a:t>&lt;&gt;() – return value expected</a:t>
+            </a:r>
+            <a:endParaRPr lang="sk-SK" dirty="0"/>
           </a:p>
         </p:txBody>
       </p:sp>
     </p:spTree>
     <p:extLst>
       <p:ext uri="{BB962C8B-B14F-4D97-AF65-F5344CB8AC3E}">
-        <p14:creationId xmlns:p14="http://schemas.microsoft.com/office/powerpoint/2010/main" val="3736787900"/>
+        <p14:creationId xmlns:p14="http://schemas.microsoft.com/office/powerpoint/2010/main" val="498375550"/>
       </p:ext>
     </p:extLst>
   </p:cSld>
   <p:clrMapOvr>
     <a:masterClrMapping/>
   </p:clrMapOvr>
-  <mc:AlternateContent xmlns:mc="http://schemas.openxmlformats.org/markup-compatibility/2006" xmlns:p14="http://schemas.microsoft.com/office/powerpoint/2010/main">
-    <mc:Choice Requires="p14">
-      <p:transition spd="slow" p14:dur="1600">
-        <p14:prism isInverted="1"/>
-      </p:transition>
-    </mc:Choice>
-    <mc:Fallback xmlns="">
-      <p:transition spd="slow">
-        <p:fade/>
-      </p:transition>
-    </mc:Fallback>
-  </mc:AlternateContent>
+  <p:transition spd="slow">
+    <p:push/>
+  </p:transition>
+  <p:timing>
+    <p:tnLst>
+      <p:par>
+        <p:cTn id="1" dur="indefinite" restart="never" nodeType="tmRoot">
+          <p:childTnLst>
+            <p:seq concurrent="1" nextAc="seek">
+              <p:cTn id="2" dur="indefinite" nodeType="mainSeq">
+                <p:childTnLst>
+                  <p:par>
+                    <p:cTn id="3" fill="hold">
+                      <p:stCondLst>
+                        <p:cond delay="indefinite"/>
+                      </p:stCondLst>
+                      <p:childTnLst>
+                        <p:par>
+                          <p:cTn id="4" fill="hold">
+                            <p:stCondLst>
+                              <p:cond delay="0"/>
+                            </p:stCondLst>
+                            <p:childTnLst>
+                              <p:par>
+                                <p:cTn id="5" presetID="1" presetClass="entr" presetSubtype="0" fill="hold" grpId="0" nodeType="clickEffect">
+                                  <p:stCondLst>
+                                    <p:cond delay="0"/>
+                                  </p:stCondLst>
+                                  <p:childTnLst>
+                                    <p:set>
+                                      <p:cBhvr>
+                                        <p:cTn id="6" dur="1" fill="hold">
+                                          <p:stCondLst>
+                                            <p:cond delay="0"/>
+                                          </p:stCondLst>
+                                        </p:cTn>
+                                        <p:tgtEl>
+                                          <p:spTgt spid="3">
+                                            <p:txEl>
+                                              <p:pRg st="0" end="0"/>
+                                            </p:txEl>
+                                          </p:spTgt>
+                                        </p:tgtEl>
+                                        <p:attrNameLst>
+                                          <p:attrName>style.visibility</p:attrName>
+                                        </p:attrNameLst>
+                                      </p:cBhvr>
+                                      <p:to>
+                                        <p:strVal val="visible"/>
+                                      </p:to>
+                                    </p:set>
+                                  </p:childTnLst>
+                                </p:cTn>
+                              </p:par>
+                            </p:childTnLst>
+                          </p:cTn>
+                        </p:par>
+                      </p:childTnLst>
+                    </p:cTn>
+                  </p:par>
+                  <p:par>
+                    <p:cTn id="7" fill="hold">
+                      <p:stCondLst>
+                        <p:cond delay="indefinite"/>
+                      </p:stCondLst>
+                      <p:childTnLst>
+                        <p:par>
+                          <p:cTn id="8" fill="hold">
+                            <p:stCondLst>
+                              <p:cond delay="0"/>
+                            </p:stCondLst>
+                            <p:childTnLst>
+                              <p:par>
+                                <p:cTn id="9" presetID="1" presetClass="entr" presetSubtype="0" fill="hold" grpId="0" nodeType="clickEffect">
+                                  <p:stCondLst>
+                                    <p:cond delay="0"/>
+                                  </p:stCondLst>
+                                  <p:childTnLst>
+                                    <p:set>
+                                      <p:cBhvr>
+                                        <p:cTn id="10" dur="1" fill="hold">
+                                          <p:stCondLst>
+                                            <p:cond delay="0"/>
+                                          </p:stCondLst>
+                                        </p:cTn>
+                                        <p:tgtEl>
+                                          <p:spTgt spid="3">
+                                            <p:txEl>
+                                              <p:pRg st="1" end="1"/>
+                                            </p:txEl>
+                                          </p:spTgt>
+                                        </p:tgtEl>
+                                        <p:attrNameLst>
+                                          <p:attrName>style.visibility</p:attrName>
+                                        </p:attrNameLst>
+                                      </p:cBhvr>
+                                      <p:to>
+                                        <p:strVal val="visible"/>
+                                      </p:to>
+                                    </p:set>
+                                  </p:childTnLst>
+                                </p:cTn>
+                              </p:par>
+                              <p:par>
+                                <p:cTn id="11" presetID="1" presetClass="entr" presetSubtype="0" fill="hold" grpId="0" nodeType="withEffect">
+                                  <p:stCondLst>
+                                    <p:cond delay="0"/>
+                                  </p:stCondLst>
+                                  <p:childTnLst>
+                                    <p:set>
+                                      <p:cBhvr>
+                                        <p:cTn id="12" dur="1" fill="hold">
+                                          <p:stCondLst>
+                                            <p:cond delay="0"/>
+                                          </p:stCondLst>
+                                        </p:cTn>
+                                        <p:tgtEl>
+                                          <p:spTgt spid="3">
+                                            <p:txEl>
+                                              <p:pRg st="2" end="2"/>
+                                            </p:txEl>
+                                          </p:spTgt>
+                                        </p:tgtEl>
+                                        <p:attrNameLst>
+                                          <p:attrName>style.visibility</p:attrName>
+                                        </p:attrNameLst>
+                                      </p:cBhvr>
+                                      <p:to>
+                                        <p:strVal val="visible"/>
+                                      </p:to>
+                                    </p:set>
+                                  </p:childTnLst>
+                                </p:cTn>
+                              </p:par>
+                              <p:par>
+                                <p:cTn id="13" presetID="1" presetClass="entr" presetSubtype="0" fill="hold" grpId="0" nodeType="withEffect">
+                                  <p:stCondLst>
+                                    <p:cond delay="0"/>
+                                  </p:stCondLst>
+                                  <p:childTnLst>
+                                    <p:set>
+                                      <p:cBhvr>
+                                        <p:cTn id="14" dur="1" fill="hold">
+                                          <p:stCondLst>
+                                            <p:cond delay="0"/>
+                                          </p:stCondLst>
+                                        </p:cTn>
+                                        <p:tgtEl>
+                                          <p:spTgt spid="3">
+                                            <p:txEl>
+                                              <p:pRg st="3" end="3"/>
+                                            </p:txEl>
+                                          </p:spTgt>
+                                        </p:tgtEl>
+                                        <p:attrNameLst>
+                                          <p:attrName>style.visibility</p:attrName>
+                                        </p:attrNameLst>
+                                      </p:cBhvr>
+                                      <p:to>
+                                        <p:strVal val="visible"/>
+                                      </p:to>
+                                    </p:set>
+                                  </p:childTnLst>
+                                </p:cTn>
+                              </p:par>
+                            </p:childTnLst>
+                          </p:cTn>
+                        </p:par>
+                      </p:childTnLst>
+                    </p:cTn>
+                  </p:par>
+                  <p:par>
+                    <p:cTn id="15" fill="hold">
+                      <p:stCondLst>
+                        <p:cond delay="indefinite"/>
+                      </p:stCondLst>
+                      <p:childTnLst>
+                        <p:par>
+                          <p:cTn id="16" fill="hold">
+                            <p:stCondLst>
+                              <p:cond delay="0"/>
+                            </p:stCondLst>
+                            <p:childTnLst>
+                              <p:par>
+                                <p:cTn id="17" presetID="1" presetClass="entr" presetSubtype="0" fill="hold" grpId="0" nodeType="clickEffect">
+                                  <p:stCondLst>
+                                    <p:cond delay="0"/>
+                                  </p:stCondLst>
+                                  <p:childTnLst>
+                                    <p:set>
+                                      <p:cBhvr>
+                                        <p:cTn id="18" dur="1" fill="hold">
+                                          <p:stCondLst>
+                                            <p:cond delay="0"/>
+                                          </p:stCondLst>
+                                        </p:cTn>
+                                        <p:tgtEl>
+                                          <p:spTgt spid="3">
+                                            <p:txEl>
+                                              <p:pRg st="4" end="4"/>
+                                            </p:txEl>
+                                          </p:spTgt>
+                                        </p:tgtEl>
+                                        <p:attrNameLst>
+                                          <p:attrName>style.visibility</p:attrName>
+                                        </p:attrNameLst>
+                                      </p:cBhvr>
+                                      <p:to>
+                                        <p:strVal val="visible"/>
+                                      </p:to>
+                                    </p:set>
+                                  </p:childTnLst>
+                                </p:cTn>
+                              </p:par>
+                            </p:childTnLst>
+                          </p:cTn>
+                        </p:par>
+                      </p:childTnLst>
+                    </p:cTn>
+                  </p:par>
+                  <p:par>
+                    <p:cTn id="19" fill="hold">
+                      <p:stCondLst>
+                        <p:cond delay="indefinite"/>
+                      </p:stCondLst>
+                      <p:childTnLst>
+                        <p:par>
+                          <p:cTn id="20" fill="hold">
+                            <p:stCondLst>
+                              <p:cond delay="0"/>
+                            </p:stCondLst>
+                            <p:childTnLst>
+                              <p:par>
+                                <p:cTn id="21" presetID="1" presetClass="entr" presetSubtype="0" fill="hold" grpId="0" nodeType="clickEffect">
+                                  <p:stCondLst>
+                                    <p:cond delay="0"/>
+                                  </p:stCondLst>
+                                  <p:childTnLst>
+                                    <p:set>
+                                      <p:cBhvr>
+                                        <p:cTn id="22" dur="1" fill="hold">
+                                          <p:stCondLst>
+                                            <p:cond delay="0"/>
+                                          </p:stCondLst>
+                                        </p:cTn>
+                                        <p:tgtEl>
+                                          <p:spTgt spid="3">
+                                            <p:txEl>
+                                              <p:pRg st="5" end="5"/>
+                                            </p:txEl>
+                                          </p:spTgt>
+                                        </p:tgtEl>
+                                        <p:attrNameLst>
+                                          <p:attrName>style.visibility</p:attrName>
+                                        </p:attrNameLst>
+                                      </p:cBhvr>
+                                      <p:to>
+                                        <p:strVal val="visible"/>
+                                      </p:to>
+                                    </p:set>
+                                  </p:childTnLst>
+                                </p:cTn>
+                              </p:par>
+                            </p:childTnLst>
+                          </p:cTn>
+                        </p:par>
+                      </p:childTnLst>
+                    </p:cTn>
+                  </p:par>
+                  <p:par>
+                    <p:cTn id="23" fill="hold">
+                      <p:stCondLst>
+                        <p:cond delay="indefinite"/>
+                      </p:stCondLst>
+                      <p:childTnLst>
+                        <p:par>
+                          <p:cTn id="24" fill="hold">
+                            <p:stCondLst>
+                              <p:cond delay="0"/>
+                            </p:stCondLst>
+                            <p:childTnLst>
+                              <p:par>
+                                <p:cTn id="25" presetID="1" presetClass="entr" presetSubtype="0" fill="hold" grpId="0" nodeType="clickEffect">
+                                  <p:stCondLst>
+                                    <p:cond delay="0"/>
+                                  </p:stCondLst>
+                                  <p:childTnLst>
+                                    <p:set>
+                                      <p:cBhvr>
+                                        <p:cTn id="26" dur="1" fill="hold">
+                                          <p:stCondLst>
+                                            <p:cond delay="0"/>
+                                          </p:stCondLst>
+                                        </p:cTn>
+                                        <p:tgtEl>
+                                          <p:spTgt spid="3">
+                                            <p:txEl>
+                                              <p:pRg st="6" end="6"/>
+                                            </p:txEl>
+                                          </p:spTgt>
+                                        </p:tgtEl>
+                                        <p:attrNameLst>
+                                          <p:attrName>style.visibility</p:attrName>
+                                        </p:attrNameLst>
+                                      </p:cBhvr>
+                                      <p:to>
+                                        <p:strVal val="visible"/>
+                                      </p:to>
+                                    </p:set>
+                                  </p:childTnLst>
+                                </p:cTn>
+                              </p:par>
+                            </p:childTnLst>
+                          </p:cTn>
+                        </p:par>
+                      </p:childTnLst>
+                    </p:cTn>
+                  </p:par>
+                </p:childTnLst>
+              </p:cTn>
+              <p:prevCondLst>
+                <p:cond evt="onPrev" delay="0">
+                  <p:tgtEl>
+                    <p:sldTgt/>
+                  </p:tgtEl>
+                </p:cond>
+              </p:prevCondLst>
+              <p:nextCondLst>
+                <p:cond evt="onNext" delay="0">
+                  <p:tgtEl>
+                    <p:sldTgt/>
+                  </p:tgtEl>
+                </p:cond>
+              </p:nextCondLst>
+            </p:seq>
+          </p:childTnLst>
+        </p:cTn>
+      </p:par>
+    </p:tnLst>
+    <p:bldLst>
+      <p:bldP spid="3" grpId="0" uiExpand="1" build="p"/>
+    </p:bldLst>
+  </p:timing>
 </p:sld>
 </file>
 
@@ -5972,7 +6338,7 @@
           <p:cNvPr id="2" name="Title 1">
             <a:extLst>
               <a:ext uri="{FF2B5EF4-FFF2-40B4-BE49-F238E27FC236}">
-                <a16:creationId xmlns:a16="http://schemas.microsoft.com/office/drawing/2014/main" id="{1D536D3E-2903-49B7-88DB-B21CB50EC139}"/>
+                <a16:creationId xmlns:a16="http://schemas.microsoft.com/office/drawing/2014/main" id="{AD5BC8F0-DE48-4D5F-B775-3B1F8E42D38C}"/>
               </a:ext>
             </a:extLst>
           </p:cNvPr>
@@ -5989,8 +6355,8 @@
           <a:lstStyle/>
           <a:p>
             <a:r>
-              <a:rPr lang="en-US" dirty="0"/>
-              <a:t>SQLite</a:t>
+              <a:rPr lang="en-US" dirty="0" err="1"/>
+              <a:t>IndexedDB</a:t>
             </a:r>
             <a:endParaRPr lang="sk-SK" dirty="0"/>
           </a:p>
@@ -6001,7 +6367,7 @@
           <p:cNvPr id="3" name="Content Placeholder 2">
             <a:extLst>
               <a:ext uri="{FF2B5EF4-FFF2-40B4-BE49-F238E27FC236}">
-                <a16:creationId xmlns:a16="http://schemas.microsoft.com/office/drawing/2014/main" id="{D78BCEC5-7131-40DB-9BCE-6833488A68C8}"/>
+                <a16:creationId xmlns:a16="http://schemas.microsoft.com/office/drawing/2014/main" id="{D1370F43-3F88-44E6-9266-5A5570D86E20}"/>
               </a:ext>
             </a:extLst>
           </p:cNvPr>
@@ -6014,49 +6380,72 @@
         </p:nvSpPr>
         <p:spPr/>
         <p:txBody>
-          <a:bodyPr/>
+          <a:bodyPr>
+            <a:normAutofit/>
+          </a:bodyPr>
           <a:lstStyle/>
           <a:p>
             <a:r>
               <a:rPr lang="en-US" dirty="0"/>
-              <a:t>We are still on the client</a:t>
+              <a:t>Size limit – depends on browser – but is in 10s or 100s of MBs</a:t>
             </a:r>
           </a:p>
           <a:p>
             <a:r>
               <a:rPr lang="en-US" dirty="0"/>
-              <a:t>Where do we store the .</a:t>
+              <a:t>There is already a 3</a:t>
+            </a:r>
+            <a:r>
+              <a:rPr lang="en-US" baseline="30000" dirty="0"/>
+              <a:t>rd</a:t>
+            </a:r>
+            <a:r>
+              <a:rPr lang="en-US" dirty="0"/>
+              <a:t> party implementation for </a:t>
             </a:r>
             <a:r>
               <a:rPr lang="en-US" dirty="0" err="1"/>
-              <a:t>db</a:t>
-            </a:r>
+              <a:t>Blazor</a:t>
+            </a:r>
+            <a:endParaRPr lang="en-US" dirty="0"/>
+          </a:p>
+          <a:p>
             <a:r>
               <a:rPr lang="en-US" dirty="0"/>
-              <a:t> file?</a:t>
+              <a:t>Also accessible from service worker</a:t>
             </a:r>
           </a:p>
           <a:p>
             <a:r>
               <a:rPr lang="en-US" dirty="0"/>
-              <a:t>Native File System to the rescue?</a:t>
-            </a:r>
-          </a:p>
-          <a:p>
+              <a:t>More complex than </a:t>
+            </a:r>
+            <a:r>
+              <a:rPr lang="en-US" dirty="0" err="1"/>
+              <a:t>LocalStorage</a:t>
+            </a:r>
+            <a:endParaRPr lang="en-US" dirty="0"/>
+          </a:p>
+          <a:p>
+            <a:pPr lvl="1"/>
             <a:r>
               <a:rPr lang="en-US" dirty="0"/>
-              <a:t>Safari and Firefox – no support yet</a:t>
-            </a:r>
-          </a:p>
-          <a:p>
-            <a:endParaRPr lang="sk-SK" dirty="0"/>
+              <a:t>Need to take care of updating schema of database on client</a:t>
+            </a:r>
+          </a:p>
+          <a:p>
+            <a:pPr lvl="1"/>
+            <a:r>
+              <a:rPr lang="en-US" dirty="0"/>
+              <a:t>But enables more advanced scenarios</a:t>
+            </a:r>
           </a:p>
         </p:txBody>
       </p:sp>
     </p:spTree>
     <p:extLst>
       <p:ext uri="{BB962C8B-B14F-4D97-AF65-F5344CB8AC3E}">
-        <p14:creationId xmlns:p14="http://schemas.microsoft.com/office/powerpoint/2010/main" val="2798469176"/>
+        <p14:creationId xmlns:p14="http://schemas.microsoft.com/office/powerpoint/2010/main" val="3736787900"/>
       </p:ext>
     </p:extLst>
   </p:cSld>
@@ -6100,6 +6489,134 @@
           <p:cNvPr id="2" name="Title 1">
             <a:extLst>
               <a:ext uri="{FF2B5EF4-FFF2-40B4-BE49-F238E27FC236}">
+                <a16:creationId xmlns:a16="http://schemas.microsoft.com/office/drawing/2014/main" id="{1D536D3E-2903-49B7-88DB-B21CB50EC139}"/>
+              </a:ext>
+            </a:extLst>
+          </p:cNvPr>
+          <p:cNvSpPr>
+            <a:spLocks noGrp="1"/>
+          </p:cNvSpPr>
+          <p:nvPr>
+            <p:ph type="title"/>
+          </p:nvPr>
+        </p:nvSpPr>
+        <p:spPr/>
+        <p:txBody>
+          <a:bodyPr/>
+          <a:lstStyle/>
+          <a:p>
+            <a:r>
+              <a:rPr lang="en-US" dirty="0"/>
+              <a:t>SQLite</a:t>
+            </a:r>
+            <a:endParaRPr lang="sk-SK" dirty="0"/>
+          </a:p>
+        </p:txBody>
+      </p:sp>
+      <p:sp>
+        <p:nvSpPr>
+          <p:cNvPr id="3" name="Content Placeholder 2">
+            <a:extLst>
+              <a:ext uri="{FF2B5EF4-FFF2-40B4-BE49-F238E27FC236}">
+                <a16:creationId xmlns:a16="http://schemas.microsoft.com/office/drawing/2014/main" id="{D78BCEC5-7131-40DB-9BCE-6833488A68C8}"/>
+              </a:ext>
+            </a:extLst>
+          </p:cNvPr>
+          <p:cNvSpPr>
+            <a:spLocks noGrp="1"/>
+          </p:cNvSpPr>
+          <p:nvPr>
+            <p:ph idx="1"/>
+          </p:nvPr>
+        </p:nvSpPr>
+        <p:spPr/>
+        <p:txBody>
+          <a:bodyPr/>
+          <a:lstStyle/>
+          <a:p>
+            <a:r>
+              <a:rPr lang="en-US" dirty="0"/>
+              <a:t>We are still on the client</a:t>
+            </a:r>
+          </a:p>
+          <a:p>
+            <a:r>
+              <a:rPr lang="en-US" dirty="0"/>
+              <a:t>Where do we store the .</a:t>
+            </a:r>
+            <a:r>
+              <a:rPr lang="en-US" dirty="0" err="1"/>
+              <a:t>db</a:t>
+            </a:r>
+            <a:r>
+              <a:rPr lang="en-US" dirty="0"/>
+              <a:t> file?</a:t>
+            </a:r>
+          </a:p>
+          <a:p>
+            <a:r>
+              <a:rPr lang="en-US" dirty="0"/>
+              <a:t>Native File System to the rescue?</a:t>
+            </a:r>
+          </a:p>
+          <a:p>
+            <a:r>
+              <a:rPr lang="en-US" dirty="0"/>
+              <a:t>Safari and Firefox – no support yet</a:t>
+            </a:r>
+          </a:p>
+          <a:p>
+            <a:endParaRPr lang="sk-SK" dirty="0"/>
+          </a:p>
+        </p:txBody>
+      </p:sp>
+    </p:spTree>
+    <p:extLst>
+      <p:ext uri="{BB962C8B-B14F-4D97-AF65-F5344CB8AC3E}">
+        <p14:creationId xmlns:p14="http://schemas.microsoft.com/office/powerpoint/2010/main" val="2798469176"/>
+      </p:ext>
+    </p:extLst>
+  </p:cSld>
+  <p:clrMapOvr>
+    <a:masterClrMapping/>
+  </p:clrMapOvr>
+  <mc:AlternateContent xmlns:mc="http://schemas.openxmlformats.org/markup-compatibility/2006" xmlns:p14="http://schemas.microsoft.com/office/powerpoint/2010/main">
+    <mc:Choice Requires="p14">
+      <p:transition spd="slow" p14:dur="1600">
+        <p14:prism isInverted="1"/>
+      </p:transition>
+    </mc:Choice>
+    <mc:Fallback xmlns="">
+      <p:transition spd="slow">
+        <p:fade/>
+      </p:transition>
+    </mc:Fallback>
+  </mc:AlternateContent>
+</p:sld>
+</file>
+
+<file path=ppt/slides/slide13.xml><?xml version="1.0" encoding="utf-8"?>
+<p:sld xmlns:a="http://schemas.openxmlformats.org/drawingml/2006/main" xmlns:r="http://schemas.openxmlformats.org/officeDocument/2006/relationships" xmlns:p="http://schemas.openxmlformats.org/presentationml/2006/main">
+  <p:cSld>
+    <p:spTree>
+      <p:nvGrpSpPr>
+        <p:cNvPr id="1" name=""/>
+        <p:cNvGrpSpPr/>
+        <p:nvPr/>
+      </p:nvGrpSpPr>
+      <p:grpSpPr>
+        <a:xfrm>
+          <a:off x="0" y="0"/>
+          <a:ext cx="0" cy="0"/>
+          <a:chOff x="0" y="0"/>
+          <a:chExt cx="0" cy="0"/>
+        </a:xfrm>
+      </p:grpSpPr>
+      <p:sp>
+        <p:nvSpPr>
+          <p:cNvPr id="2" name="Title 1">
+            <a:extLst>
+              <a:ext uri="{FF2B5EF4-FFF2-40B4-BE49-F238E27FC236}">
                 <a16:creationId xmlns:a16="http://schemas.microsoft.com/office/drawing/2014/main" id="{CE71B924-20A0-4D22-B505-C3CB9FAB6708}"/>
               </a:ext>
             </a:extLst>
@@ -6184,7 +6701,7 @@
 </p:sld>
 </file>
 
-<file path=ppt/slides/slide13.xml><?xml version="1.0" encoding="utf-8"?>
+<file path=ppt/slides/slide14.xml><?xml version="1.0" encoding="utf-8"?>
 <p:sld xmlns:a="http://schemas.openxmlformats.org/drawingml/2006/main" xmlns:r="http://schemas.openxmlformats.org/officeDocument/2006/relationships" xmlns:p="http://schemas.openxmlformats.org/presentationml/2006/main">
   <p:cSld>
     <p:spTree>
@@ -7850,7 +8367,7 @@
 </p:sld>
 </file>
 
-<file path=ppt/slides/slide14.xml><?xml version="1.0" encoding="utf-8"?>
+<file path=ppt/slides/slide15.xml><?xml version="1.0" encoding="utf-8"?>
 <p:sld xmlns:a="http://schemas.openxmlformats.org/drawingml/2006/main" xmlns:r="http://schemas.openxmlformats.org/officeDocument/2006/relationships" xmlns:p="http://schemas.openxmlformats.org/presentationml/2006/main">
   <p:cSld>
     <p:spTree>
@@ -10325,7 +10842,7 @@
 </p:sld>
 </file>
 
-<file path=ppt/slides/slide15.xml><?xml version="1.0" encoding="utf-8"?>
+<file path=ppt/slides/slide16.xml><?xml version="1.0" encoding="utf-8"?>
 <p:sld xmlns:a="http://schemas.openxmlformats.org/drawingml/2006/main" xmlns:r="http://schemas.openxmlformats.org/officeDocument/2006/relationships" xmlns:p="http://schemas.openxmlformats.org/presentationml/2006/main">
   <p:cSld>
     <p:spTree>
@@ -11544,7 +12061,7 @@
 </p:sld>
 </file>
 
-<file path=ppt/slides/slide16.xml><?xml version="1.0" encoding="utf-8"?>
+<file path=ppt/slides/slide17.xml><?xml version="1.0" encoding="utf-8"?>
 <p:sld xmlns:a="http://schemas.openxmlformats.org/drawingml/2006/main" xmlns:r="http://schemas.openxmlformats.org/officeDocument/2006/relationships" xmlns:p="http://schemas.openxmlformats.org/presentationml/2006/main">
   <p:cSld>
     <p:spTree>
@@ -12034,7 +12551,7 @@
 </p:sld>
 </file>
 
-<file path=ppt/slides/slide17.xml><?xml version="1.0" encoding="utf-8"?>
+<file path=ppt/slides/slide18.xml><?xml version="1.0" encoding="utf-8"?>
 <p:sld xmlns:a="http://schemas.openxmlformats.org/drawingml/2006/main" xmlns:r="http://schemas.openxmlformats.org/officeDocument/2006/relationships" xmlns:p="http://schemas.openxmlformats.org/presentationml/2006/main">
   <p:cSld>
     <p:spTree>
@@ -14357,7 +14874,7 @@
           <p:cNvPr id="2" name="Title 1">
             <a:extLst>
               <a:ext uri="{FF2B5EF4-FFF2-40B4-BE49-F238E27FC236}">
-                <a16:creationId xmlns:a16="http://schemas.microsoft.com/office/drawing/2014/main" id="{EA11EC8D-13CE-4510-9934-DAC95064048B}"/>
+                <a16:creationId xmlns:a16="http://schemas.microsoft.com/office/drawing/2014/main" id="{D688962B-4D14-4D3C-9CA0-D9EBF4F6DBC1}"/>
               </a:ext>
             </a:extLst>
           </p:cNvPr>
@@ -14375,17 +14892,9 @@
           <a:p>
             <a:r>
               <a:rPr lang="en-US" dirty="0"/>
-              <a:t>Why Apps in </a:t>
-            </a:r>
-            <a:r>
-              <a:rPr lang="en-US" dirty="0" err="1"/>
-              <a:t>Blazor</a:t>
-            </a:r>
-            <a:r>
-              <a:rPr lang="en-US" dirty="0"/>
-              <a:t>?</a:t>
-            </a:r>
-            <a:endParaRPr lang="sk-SK" dirty="0"/>
+              <a:t>Service Worker registration</a:t>
+            </a:r>
+            <a:endParaRPr lang="cs-CZ" dirty="0"/>
           </a:p>
         </p:txBody>
       </p:sp>
@@ -14394,7 +14903,7 @@
           <p:cNvPr id="3" name="Content Placeholder 2">
             <a:extLst>
               <a:ext uri="{FF2B5EF4-FFF2-40B4-BE49-F238E27FC236}">
-                <a16:creationId xmlns:a16="http://schemas.microsoft.com/office/drawing/2014/main" id="{0AEC84CE-ADFE-41FA-AE4D-ED21228A07CF}"/>
+                <a16:creationId xmlns:a16="http://schemas.microsoft.com/office/drawing/2014/main" id="{C1D8A61C-AD28-4798-9B4D-E1FA2C71BCB9}"/>
               </a:ext>
             </a:extLst>
           </p:cNvPr>
@@ -14413,525 +14922,211 @@
           <a:lstStyle/>
           <a:p>
             <a:r>
-              <a:rPr lang="en-US" dirty="0" err="1"/>
-              <a:t>Blazor</a:t>
-            </a:r>
-            <a:r>
               <a:rPr lang="en-US" dirty="0"/>
-              <a:t> Cons:</a:t>
-            </a:r>
+              <a:t>Check if service worker is supported</a:t>
+            </a:r>
+            <a:endParaRPr lang="en-US" dirty="0">
+              <a:solidFill>
+                <a:srgbClr val="0000FF"/>
+              </a:solidFill>
+            </a:endParaRPr>
+          </a:p>
+          <a:p>
+            <a:pPr marL="457200" lvl="1" indent="0">
+              <a:buNone/>
+            </a:pPr>
+            <a:r>
+              <a:rPr lang="cs-CZ" dirty="0" err="1">
+                <a:solidFill>
+                  <a:srgbClr val="0000FF"/>
+                </a:solidFill>
+              </a:rPr>
+              <a:t>if</a:t>
+            </a:r>
+            <a:r>
+              <a:rPr lang="cs-CZ" dirty="0">
+                <a:solidFill>
+                  <a:srgbClr val="000000"/>
+                </a:solidFill>
+              </a:rPr>
+              <a:t> (</a:t>
+            </a:r>
+            <a:r>
+              <a:rPr lang="cs-CZ" dirty="0">
+                <a:solidFill>
+                  <a:srgbClr val="A31515"/>
+                </a:solidFill>
+              </a:rPr>
+              <a:t>'</a:t>
+            </a:r>
+            <a:r>
+              <a:rPr lang="cs-CZ" dirty="0" err="1">
+                <a:solidFill>
+                  <a:srgbClr val="A31515"/>
+                </a:solidFill>
+              </a:rPr>
+              <a:t>serviceWorker</a:t>
+            </a:r>
+            <a:r>
+              <a:rPr lang="cs-CZ" dirty="0">
+                <a:solidFill>
+                  <a:srgbClr val="A31515"/>
+                </a:solidFill>
+              </a:rPr>
+              <a:t>'</a:t>
+            </a:r>
+            <a:r>
+              <a:rPr lang="cs-CZ" dirty="0">
+                <a:solidFill>
+                  <a:srgbClr val="000000"/>
+                </a:solidFill>
+              </a:rPr>
+              <a:t> </a:t>
+            </a:r>
+            <a:r>
+              <a:rPr lang="cs-CZ" dirty="0">
+                <a:solidFill>
+                  <a:srgbClr val="0000FF"/>
+                </a:solidFill>
+              </a:rPr>
+              <a:t>in</a:t>
+            </a:r>
+            <a:r>
+              <a:rPr lang="cs-CZ" dirty="0">
+                <a:solidFill>
+                  <a:srgbClr val="000000"/>
+                </a:solidFill>
+              </a:rPr>
+              <a:t> </a:t>
+            </a:r>
+            <a:r>
+              <a:rPr lang="cs-CZ" dirty="0" err="1">
+                <a:solidFill>
+                  <a:srgbClr val="000000"/>
+                </a:solidFill>
+              </a:rPr>
+              <a:t>navigator</a:t>
+            </a:r>
+            <a:r>
+              <a:rPr lang="cs-CZ" dirty="0">
+                <a:solidFill>
+                  <a:srgbClr val="000000"/>
+                </a:solidFill>
+              </a:rPr>
+              <a:t>)</a:t>
+            </a:r>
+            <a:endParaRPr lang="en-US" dirty="0">
+              <a:solidFill>
+                <a:srgbClr val="000000"/>
+              </a:solidFill>
+            </a:endParaRPr>
+          </a:p>
+          <a:p>
+            <a:r>
+              <a:rPr lang="en-US" dirty="0">
+                <a:solidFill>
+                  <a:srgbClr val="000000"/>
+                </a:solidFill>
+              </a:rPr>
+              <a:t>Register</a:t>
+            </a:r>
+          </a:p>
+          <a:p>
+            <a:pPr marL="457200" lvl="1" indent="0">
+              <a:buNone/>
+            </a:pPr>
+            <a:r>
+              <a:rPr lang="cs-CZ" dirty="0" err="1">
+                <a:solidFill>
+                  <a:srgbClr val="000000"/>
+                </a:solidFill>
+              </a:rPr>
+              <a:t>navigator.serviceWorker.register</a:t>
+            </a:r>
+            <a:r>
+              <a:rPr lang="cs-CZ" dirty="0">
+                <a:solidFill>
+                  <a:srgbClr val="000000"/>
+                </a:solidFill>
+              </a:rPr>
+              <a:t>(</a:t>
+            </a:r>
+            <a:r>
+              <a:rPr lang="sk-SK" dirty="0">
+                <a:solidFill>
+                  <a:srgbClr val="A31515"/>
+                </a:solidFill>
+              </a:rPr>
+              <a:t>'</a:t>
+            </a:r>
+            <a:r>
+              <a:rPr lang="en-US" dirty="0">
+                <a:solidFill>
+                  <a:srgbClr val="A31515"/>
+                </a:solidFill>
+              </a:rPr>
+              <a:t>service-worker</a:t>
+            </a:r>
+            <a:r>
+              <a:rPr lang="cs-CZ" dirty="0">
+                <a:solidFill>
+                  <a:srgbClr val="A31515"/>
+                </a:solidFill>
+              </a:rPr>
+              <a:t>.</a:t>
+            </a:r>
+            <a:r>
+              <a:rPr lang="cs-CZ" dirty="0" err="1">
+                <a:solidFill>
+                  <a:srgbClr val="A31515"/>
+                </a:solidFill>
+              </a:rPr>
+              <a:t>js</a:t>
+            </a:r>
+            <a:r>
+              <a:rPr lang="cs-CZ" dirty="0">
+                <a:solidFill>
+                  <a:srgbClr val="A31515"/>
+                </a:solidFill>
+              </a:rPr>
+              <a:t>'</a:t>
+            </a:r>
+            <a:r>
+              <a:rPr lang="cs-CZ" dirty="0">
+                <a:solidFill>
+                  <a:srgbClr val="000000"/>
+                </a:solidFill>
+              </a:rPr>
+              <a:t>)</a:t>
+            </a:r>
+            <a:r>
+              <a:rPr lang="en-US" dirty="0">
+                <a:solidFill>
+                  <a:srgbClr val="000000"/>
+                </a:solidFill>
+              </a:rPr>
+              <a:t>;</a:t>
+            </a:r>
+            <a:endParaRPr lang="cs-CZ" dirty="0">
+              <a:solidFill>
+                <a:srgbClr val="000000"/>
+              </a:solidFill>
+            </a:endParaRPr>
           </a:p>
           <a:p>
             <a:pPr lvl="1"/>
-            <a:r>
-              <a:rPr lang="en-US" dirty="0"/>
-              <a:t>Bigger size on first page load</a:t>
-            </a:r>
-          </a:p>
-          <a:p>
-            <a:pPr lvl="1"/>
-            <a:r>
-              <a:rPr lang="en-US" dirty="0"/>
-              <a:t>Uses client’s computing power</a:t>
-            </a:r>
-          </a:p>
-          <a:p>
-            <a:pPr lvl="1"/>
-            <a:r>
-              <a:rPr lang="en-US" dirty="0"/>
-              <a:t>It is on the client – no direct database connection</a:t>
-            </a:r>
-          </a:p>
-          <a:p>
-            <a:pPr lvl="1"/>
-            <a:r>
-              <a:rPr lang="en-US" dirty="0"/>
-              <a:t>Usually communicates with an API</a:t>
-            </a:r>
-          </a:p>
-          <a:p>
-            <a:r>
-              <a:rPr lang="en-US" dirty="0" err="1"/>
-              <a:t>Blazor</a:t>
-            </a:r>
-            <a:r>
-              <a:rPr lang="en-US" dirty="0"/>
-              <a:t> Pros:</a:t>
-            </a:r>
-          </a:p>
-          <a:p>
-            <a:pPr lvl="1"/>
-            <a:r>
-              <a:rPr lang="en-US" dirty="0"/>
-              <a:t>Runs on client</a:t>
-            </a:r>
-          </a:p>
-          <a:p>
-            <a:pPr lvl="1"/>
-            <a:r>
-              <a:rPr lang="en-US" dirty="0"/>
-              <a:t>Doesn’t need server after first load</a:t>
-            </a:r>
-          </a:p>
-          <a:p>
-            <a:pPr lvl="1"/>
-            <a:r>
-              <a:rPr lang="en-US" dirty="0"/>
-              <a:t>Runs alongside JavaScript</a:t>
-            </a:r>
-          </a:p>
-          <a:p>
-            <a:pPr lvl="1"/>
-            <a:r>
-              <a:rPr lang="en-US" dirty="0"/>
-              <a:t>Can communicate with JavaScript</a:t>
-            </a:r>
-          </a:p>
-          <a:p>
-            <a:pPr lvl="1"/>
-            <a:endParaRPr lang="en-US" dirty="0"/>
+            <a:endParaRPr lang="cs-CZ" dirty="0">
+              <a:solidFill>
+                <a:srgbClr val="000000"/>
+              </a:solidFill>
+            </a:endParaRPr>
           </a:p>
         </p:txBody>
       </p:sp>
     </p:spTree>
     <p:extLst>
       <p:ext uri="{BB962C8B-B14F-4D97-AF65-F5344CB8AC3E}">
-        <p14:creationId xmlns:p14="http://schemas.microsoft.com/office/powerpoint/2010/main" val="3423923341"/>
-      </p:ext>
-    </p:extLst>
-  </p:cSld>
-  <p:clrMapOvr>
-    <a:masterClrMapping/>
-  </p:clrMapOvr>
-  <mc:AlternateContent xmlns:mc="http://schemas.openxmlformats.org/markup-compatibility/2006" xmlns:p14="http://schemas.microsoft.com/office/powerpoint/2010/main">
-    <mc:Choice Requires="p14">
-      <p:transition spd="slow" p14:dur="1600">
-        <p14:prism isInverted="1"/>
-      </p:transition>
-    </mc:Choice>
-    <mc:Fallback xmlns="">
-      <p:transition spd="slow">
-        <p:fade/>
-      </p:transition>
-    </mc:Fallback>
-  </mc:AlternateContent>
-</p:sld>
-</file>
-
-<file path=ppt/slides/slide7.xml><?xml version="1.0" encoding="utf-8"?>
-<p:sld xmlns:a="http://schemas.openxmlformats.org/drawingml/2006/main" xmlns:r="http://schemas.openxmlformats.org/officeDocument/2006/relationships" xmlns:p="http://schemas.openxmlformats.org/presentationml/2006/main">
-  <p:cSld>
-    <p:spTree>
-      <p:nvGrpSpPr>
-        <p:cNvPr id="1" name=""/>
-        <p:cNvGrpSpPr/>
-        <p:nvPr/>
-      </p:nvGrpSpPr>
-      <p:grpSpPr>
-        <a:xfrm>
-          <a:off x="0" y="0"/>
-          <a:ext cx="0" cy="0"/>
-          <a:chOff x="0" y="0"/>
-          <a:chExt cx="0" cy="0"/>
-        </a:xfrm>
-      </p:grpSpPr>
-      <p:sp>
-        <p:nvSpPr>
-          <p:cNvPr id="2" name="Title 1">
-            <a:extLst>
-              <a:ext uri="{FF2B5EF4-FFF2-40B4-BE49-F238E27FC236}">
-                <a16:creationId xmlns:a16="http://schemas.microsoft.com/office/drawing/2014/main" id="{BBE58F59-C8F6-4A9F-855E-ECC1AB47429D}"/>
-              </a:ext>
-            </a:extLst>
-          </p:cNvPr>
-          <p:cNvSpPr>
-            <a:spLocks noGrp="1"/>
-          </p:cNvSpPr>
-          <p:nvPr>
-            <p:ph type="title"/>
-          </p:nvPr>
-        </p:nvSpPr>
-        <p:spPr/>
-        <p:txBody>
-          <a:bodyPr/>
-          <a:lstStyle/>
-          <a:p>
-            <a:r>
-              <a:rPr lang="en-US" dirty="0"/>
-              <a:t>Local storage</a:t>
-            </a:r>
-            <a:endParaRPr lang="sk-SK" dirty="0"/>
-          </a:p>
-        </p:txBody>
-      </p:sp>
-      <p:sp>
-        <p:nvSpPr>
-          <p:cNvPr id="3" name="Content Placeholder 2">
-            <a:extLst>
-              <a:ext uri="{FF2B5EF4-FFF2-40B4-BE49-F238E27FC236}">
-                <a16:creationId xmlns:a16="http://schemas.microsoft.com/office/drawing/2014/main" id="{A8A96B8B-2D53-4BD6-AC2D-B9C580B2E81A}"/>
-              </a:ext>
-            </a:extLst>
-          </p:cNvPr>
-          <p:cNvSpPr>
-            <a:spLocks noGrp="1"/>
-          </p:cNvSpPr>
-          <p:nvPr>
-            <p:ph idx="1"/>
-          </p:nvPr>
-        </p:nvSpPr>
-        <p:spPr/>
-        <p:txBody>
-          <a:bodyPr/>
-          <a:lstStyle/>
-          <a:p>
-            <a:r>
-              <a:rPr lang="en-US" dirty="0"/>
-              <a:t>No expiration date</a:t>
-            </a:r>
-          </a:p>
-          <a:p>
-            <a:r>
-              <a:rPr lang="en-US" dirty="0"/>
-              <a:t>Key-value storage for strings</a:t>
-            </a:r>
-          </a:p>
-          <a:p>
-            <a:r>
-              <a:rPr lang="en-US" dirty="0"/>
-              <a:t>About 5MB limit</a:t>
-            </a:r>
-          </a:p>
-          <a:p>
-            <a:endParaRPr lang="en-US" dirty="0"/>
-          </a:p>
-          <a:p>
-            <a:r>
-              <a:rPr lang="en-US" dirty="0"/>
-              <a:t>Not accessible from service worker</a:t>
-            </a:r>
-          </a:p>
-          <a:p>
-            <a:endParaRPr lang="sk-SK" dirty="0"/>
-          </a:p>
-        </p:txBody>
-      </p:sp>
-    </p:spTree>
-    <p:extLst>
-      <p:ext uri="{BB962C8B-B14F-4D97-AF65-F5344CB8AC3E}">
-        <p14:creationId xmlns:p14="http://schemas.microsoft.com/office/powerpoint/2010/main" val="3933944259"/>
-      </p:ext>
-    </p:extLst>
-  </p:cSld>
-  <p:clrMapOvr>
-    <a:masterClrMapping/>
-  </p:clrMapOvr>
-  <mc:AlternateContent xmlns:mc="http://schemas.openxmlformats.org/markup-compatibility/2006" xmlns:p14="http://schemas.microsoft.com/office/powerpoint/2010/main">
-    <mc:Choice Requires="p14">
-      <p:transition spd="slow" p14:dur="1600">
-        <p14:prism isInverted="1"/>
-      </p:transition>
-    </mc:Choice>
-    <mc:Fallback xmlns="">
-      <p:transition spd="slow">
-        <p:fade/>
-      </p:transition>
-    </mc:Fallback>
-  </mc:AlternateContent>
-</p:sld>
-</file>
-
-<file path=ppt/slides/slide8.xml><?xml version="1.0" encoding="utf-8"?>
-<p:sld xmlns:a="http://schemas.openxmlformats.org/drawingml/2006/main" xmlns:r="http://schemas.openxmlformats.org/officeDocument/2006/relationships" xmlns:p="http://schemas.openxmlformats.org/presentationml/2006/main">
-  <p:cSld>
-    <p:spTree>
-      <p:nvGrpSpPr>
-        <p:cNvPr id="1" name=""/>
-        <p:cNvGrpSpPr/>
-        <p:nvPr/>
-      </p:nvGrpSpPr>
-      <p:grpSpPr>
-        <a:xfrm>
-          <a:off x="0" y="0"/>
-          <a:ext cx="0" cy="0"/>
-          <a:chOff x="0" y="0"/>
-          <a:chExt cx="0" cy="0"/>
-        </a:xfrm>
-      </p:grpSpPr>
-      <p:sp>
-        <p:nvSpPr>
-          <p:cNvPr id="2" name="Title 1">
-            <a:extLst>
-              <a:ext uri="{FF2B5EF4-FFF2-40B4-BE49-F238E27FC236}">
-                <a16:creationId xmlns:a16="http://schemas.microsoft.com/office/drawing/2014/main" id="{C50C6A3C-05C2-418D-8C6E-126AD8203F29}"/>
-              </a:ext>
-            </a:extLst>
-          </p:cNvPr>
-          <p:cNvSpPr>
-            <a:spLocks noGrp="1"/>
-          </p:cNvSpPr>
-          <p:nvPr>
-            <p:ph type="title"/>
-          </p:nvPr>
-        </p:nvSpPr>
-        <p:spPr/>
-        <p:txBody>
-          <a:bodyPr/>
-          <a:lstStyle/>
-          <a:p>
-            <a:r>
-              <a:rPr lang="en-US" dirty="0"/>
-              <a:t>Sync When Online</a:t>
-            </a:r>
-            <a:endParaRPr lang="sk-SK" dirty="0"/>
-          </a:p>
-        </p:txBody>
-      </p:sp>
-      <p:sp>
-        <p:nvSpPr>
-          <p:cNvPr id="3" name="Content Placeholder 2">
-            <a:extLst>
-              <a:ext uri="{FF2B5EF4-FFF2-40B4-BE49-F238E27FC236}">
-                <a16:creationId xmlns:a16="http://schemas.microsoft.com/office/drawing/2014/main" id="{BC78D0D2-0DB6-4136-B120-8F99D1459EB7}"/>
-              </a:ext>
-            </a:extLst>
-          </p:cNvPr>
-          <p:cNvSpPr>
-            <a:spLocks noGrp="1"/>
-          </p:cNvSpPr>
-          <p:nvPr>
-            <p:ph idx="1"/>
-          </p:nvPr>
-        </p:nvSpPr>
-        <p:spPr/>
-        <p:txBody>
-          <a:bodyPr/>
-          <a:lstStyle/>
-          <a:p>
-            <a:r>
-              <a:rPr lang="en-US" dirty="0"/>
-              <a:t>Detect when the web goes online/offline</a:t>
-            </a:r>
-          </a:p>
-          <a:p>
-            <a:pPr lvl="1"/>
-            <a:r>
-              <a:rPr lang="en-US" dirty="0"/>
-              <a:t>JavaScript - </a:t>
-            </a:r>
-            <a:r>
-              <a:rPr lang="en-US" dirty="0" err="1"/>
-              <a:t>navigator.online</a:t>
-            </a:r>
-            <a:endParaRPr lang="en-US" dirty="0"/>
-          </a:p>
-          <a:p>
-            <a:r>
-              <a:rPr lang="en-US" dirty="0"/>
-              <a:t>Sync local data with server</a:t>
-            </a:r>
-          </a:p>
-          <a:p>
-            <a:pPr lvl="1"/>
-            <a:r>
-              <a:rPr lang="en-US" dirty="0"/>
-              <a:t>Logic depends on application</a:t>
-            </a:r>
-          </a:p>
-          <a:p>
-            <a:endParaRPr lang="sk-SK" dirty="0"/>
-          </a:p>
-        </p:txBody>
-      </p:sp>
-    </p:spTree>
-    <p:extLst>
-      <p:ext uri="{BB962C8B-B14F-4D97-AF65-F5344CB8AC3E}">
-        <p14:creationId xmlns:p14="http://schemas.microsoft.com/office/powerpoint/2010/main" val="1552261157"/>
-      </p:ext>
-    </p:extLst>
-  </p:cSld>
-  <p:clrMapOvr>
-    <a:masterClrMapping/>
-  </p:clrMapOvr>
-  <mc:AlternateContent xmlns:mc="http://schemas.openxmlformats.org/markup-compatibility/2006" xmlns:p14="http://schemas.microsoft.com/office/powerpoint/2010/main">
-    <mc:Choice Requires="p14">
-      <p:transition spd="slow" p14:dur="1600">
-        <p14:prism isInverted="1"/>
-      </p:transition>
-    </mc:Choice>
-    <mc:Fallback xmlns="">
-      <p:transition spd="slow">
-        <p:fade/>
-      </p:transition>
-    </mc:Fallback>
-  </mc:AlternateContent>
-</p:sld>
-</file>
-
-<file path=ppt/slides/slide9.xml><?xml version="1.0" encoding="utf-8"?>
-<p:sld xmlns:a="http://schemas.openxmlformats.org/drawingml/2006/main" xmlns:r="http://schemas.openxmlformats.org/officeDocument/2006/relationships" xmlns:p="http://schemas.openxmlformats.org/presentationml/2006/main">
-  <p:cSld>
-    <p:spTree>
-      <p:nvGrpSpPr>
-        <p:cNvPr id="1" name=""/>
-        <p:cNvGrpSpPr/>
-        <p:nvPr/>
-      </p:nvGrpSpPr>
-      <p:grpSpPr>
-        <a:xfrm>
-          <a:off x="0" y="0"/>
-          <a:ext cx="0" cy="0"/>
-          <a:chOff x="0" y="0"/>
-          <a:chExt cx="0" cy="0"/>
-        </a:xfrm>
-      </p:grpSpPr>
-      <p:sp>
-        <p:nvSpPr>
-          <p:cNvPr id="2" name="Title 1">
-            <a:extLst>
-              <a:ext uri="{FF2B5EF4-FFF2-40B4-BE49-F238E27FC236}">
-                <a16:creationId xmlns:a16="http://schemas.microsoft.com/office/drawing/2014/main" id="{D16D6AAA-F746-465E-B570-B5B348B292F7}"/>
-              </a:ext>
-            </a:extLst>
-          </p:cNvPr>
-          <p:cNvSpPr>
-            <a:spLocks noGrp="1"/>
-          </p:cNvSpPr>
-          <p:nvPr>
-            <p:ph type="title"/>
-          </p:nvPr>
-        </p:nvSpPr>
-        <p:spPr/>
-        <p:txBody>
-          <a:bodyPr/>
-          <a:lstStyle/>
-          <a:p>
-            <a:r>
-              <a:rPr lang="en-US" dirty="0"/>
-              <a:t>JavaScript Interoperability</a:t>
-            </a:r>
-            <a:endParaRPr lang="sk-SK" dirty="0"/>
-          </a:p>
-        </p:txBody>
-      </p:sp>
-      <p:sp>
-        <p:nvSpPr>
-          <p:cNvPr id="3" name="Content Placeholder 2">
-            <a:extLst>
-              <a:ext uri="{FF2B5EF4-FFF2-40B4-BE49-F238E27FC236}">
-                <a16:creationId xmlns:a16="http://schemas.microsoft.com/office/drawing/2014/main" id="{84390C19-61A3-4AB6-AE8E-3228A123A11E}"/>
-              </a:ext>
-            </a:extLst>
-          </p:cNvPr>
-          <p:cNvSpPr>
-            <a:spLocks noGrp="1"/>
-          </p:cNvSpPr>
-          <p:nvPr>
-            <p:ph idx="1"/>
-          </p:nvPr>
-        </p:nvSpPr>
-        <p:spPr/>
-        <p:txBody>
-          <a:bodyPr/>
-          <a:lstStyle/>
-          <a:p>
-            <a:r>
-              <a:rPr lang="en-US" b="1" dirty="0"/>
-              <a:t>[</a:t>
-            </a:r>
-            <a:r>
-              <a:rPr lang="en-US" b="1" dirty="0" err="1"/>
-              <a:t>JSInvokable</a:t>
-            </a:r>
-            <a:r>
-              <a:rPr lang="en-US" b="1" dirty="0"/>
-              <a:t>]</a:t>
-            </a:r>
-            <a:r>
-              <a:rPr lang="en-US" dirty="0"/>
-              <a:t> attribute – enable calling of method from JavaScript</a:t>
-            </a:r>
-          </a:p>
-          <a:p>
-            <a:pPr lvl="1"/>
-            <a:r>
-              <a:rPr lang="en-US" b="1" dirty="0"/>
-              <a:t>In JavaScript - </a:t>
-            </a:r>
-            <a:r>
-              <a:rPr lang="en-US" b="1" dirty="0" err="1"/>
-              <a:t>interop.invokeMethodAsync</a:t>
-            </a:r>
-            <a:r>
-              <a:rPr lang="en-US" b="1" dirty="0"/>
-              <a:t>()</a:t>
-            </a:r>
-          </a:p>
-          <a:p>
-            <a:pPr lvl="2"/>
-            <a:r>
-              <a:rPr lang="en-US" b="1" dirty="0"/>
-              <a:t>1</a:t>
-            </a:r>
-            <a:r>
-              <a:rPr lang="en-US" b="1" baseline="30000" dirty="0"/>
-              <a:t>st</a:t>
-            </a:r>
-            <a:r>
-              <a:rPr lang="en-US" b="1" dirty="0"/>
-              <a:t> parameter – name of method</a:t>
-            </a:r>
-          </a:p>
-          <a:p>
-            <a:pPr lvl="2"/>
-            <a:r>
-              <a:rPr lang="en-US" b="1" dirty="0"/>
-              <a:t>Other parameters – method parameters</a:t>
-            </a:r>
-          </a:p>
-          <a:p>
-            <a:r>
-              <a:rPr lang="en-US" b="1" dirty="0" err="1"/>
-              <a:t>IJSRuntime</a:t>
-            </a:r>
-            <a:r>
-              <a:rPr lang="en-US" b="1" dirty="0"/>
-              <a:t> – </a:t>
-            </a:r>
-            <a:r>
-              <a:rPr lang="en-US" dirty="0"/>
-              <a:t>run JavaScript from C# code</a:t>
-            </a:r>
-          </a:p>
-          <a:p>
-            <a:pPr lvl="1"/>
-            <a:r>
-              <a:rPr lang="en-US" dirty="0" err="1"/>
-              <a:t>InvokeVoidAsync</a:t>
-            </a:r>
-            <a:r>
-              <a:rPr lang="en-US" dirty="0"/>
-              <a:t>() – no return value expected</a:t>
-            </a:r>
-          </a:p>
-          <a:p>
-            <a:pPr lvl="1"/>
-            <a:r>
-              <a:rPr lang="en-US" dirty="0" err="1"/>
-              <a:t>InvokeAsync</a:t>
-            </a:r>
-            <a:r>
-              <a:rPr lang="en-US" dirty="0"/>
-              <a:t>&lt;&gt;() – return value expected</a:t>
-            </a:r>
-            <a:endParaRPr lang="sk-SK" dirty="0"/>
-          </a:p>
-        </p:txBody>
-      </p:sp>
-    </p:spTree>
-    <p:extLst>
-      <p:ext uri="{BB962C8B-B14F-4D97-AF65-F5344CB8AC3E}">
-        <p14:creationId xmlns:p14="http://schemas.microsoft.com/office/powerpoint/2010/main" val="498375550"/>
+        <p14:creationId xmlns:p14="http://schemas.microsoft.com/office/powerpoint/2010/main" val="3817473256"/>
       </p:ext>
     </p:extLst>
   </p:cSld>
@@ -14992,33 +15187,15 @@
                                   </p:childTnLst>
                                 </p:cTn>
                               </p:par>
-                            </p:childTnLst>
-                          </p:cTn>
-                        </p:par>
-                      </p:childTnLst>
-                    </p:cTn>
-                  </p:par>
-                  <p:par>
-                    <p:cTn id="7" fill="hold">
-                      <p:stCondLst>
-                        <p:cond delay="indefinite"/>
-                      </p:stCondLst>
-                      <p:childTnLst>
-                        <p:par>
-                          <p:cTn id="8" fill="hold">
-                            <p:stCondLst>
-                              <p:cond delay="0"/>
-                            </p:stCondLst>
-                            <p:childTnLst>
                               <p:par>
-                                <p:cTn id="9" presetID="1" presetClass="entr" presetSubtype="0" fill="hold" grpId="0" nodeType="clickEffect">
+                                <p:cTn id="7" presetID="1" presetClass="entr" presetSubtype="0" fill="hold" grpId="0" nodeType="withEffect">
                                   <p:stCondLst>
                                     <p:cond delay="0"/>
                                   </p:stCondLst>
                                   <p:childTnLst>
                                     <p:set>
                                       <p:cBhvr>
-                                        <p:cTn id="10" dur="1" fill="hold">
+                                        <p:cTn id="8" dur="1" fill="hold">
                                           <p:stCondLst>
                                             <p:cond delay="0"/>
                                           </p:stCondLst>
@@ -15041,8 +15218,26 @@
                                   </p:childTnLst>
                                 </p:cTn>
                               </p:par>
+                            </p:childTnLst>
+                          </p:cTn>
+                        </p:par>
+                      </p:childTnLst>
+                    </p:cTn>
+                  </p:par>
+                  <p:par>
+                    <p:cTn id="9" fill="hold">
+                      <p:stCondLst>
+                        <p:cond delay="indefinite"/>
+                      </p:stCondLst>
+                      <p:childTnLst>
+                        <p:par>
+                          <p:cTn id="10" fill="hold">
+                            <p:stCondLst>
+                              <p:cond delay="0"/>
+                            </p:stCondLst>
+                            <p:childTnLst>
                               <p:par>
-                                <p:cTn id="11" presetID="1" presetClass="entr" presetSubtype="0" fill="hold" grpId="0" nodeType="withEffect">
+                                <p:cTn id="11" presetID="1" presetClass="entr" presetSubtype="0" fill="hold" grpId="0" nodeType="clickEffect">
                                   <p:stCondLst>
                                     <p:cond delay="0"/>
                                   </p:stCondLst>
@@ -15109,153 +15304,6 @@
                       </p:childTnLst>
                     </p:cTn>
                   </p:par>
-                  <p:par>
-                    <p:cTn id="15" fill="hold">
-                      <p:stCondLst>
-                        <p:cond delay="indefinite"/>
-                      </p:stCondLst>
-                      <p:childTnLst>
-                        <p:par>
-                          <p:cTn id="16" fill="hold">
-                            <p:stCondLst>
-                              <p:cond delay="0"/>
-                            </p:stCondLst>
-                            <p:childTnLst>
-                              <p:par>
-                                <p:cTn id="17" presetID="1" presetClass="entr" presetSubtype="0" fill="hold" grpId="0" nodeType="clickEffect">
-                                  <p:stCondLst>
-                                    <p:cond delay="0"/>
-                                  </p:stCondLst>
-                                  <p:childTnLst>
-                                    <p:set>
-                                      <p:cBhvr>
-                                        <p:cTn id="18" dur="1" fill="hold">
-                                          <p:stCondLst>
-                                            <p:cond delay="0"/>
-                                          </p:stCondLst>
-                                        </p:cTn>
-                                        <p:tgtEl>
-                                          <p:spTgt spid="3">
-                                            <p:txEl>
-                                              <p:pRg st="4" end="4"/>
-                                            </p:txEl>
-                                          </p:spTgt>
-                                        </p:tgtEl>
-                                        <p:attrNameLst>
-                                          <p:attrName>style.visibility</p:attrName>
-                                        </p:attrNameLst>
-                                      </p:cBhvr>
-                                      <p:to>
-                                        <p:strVal val="visible"/>
-                                      </p:to>
-                                    </p:set>
-                                  </p:childTnLst>
-                                </p:cTn>
-                              </p:par>
-                            </p:childTnLst>
-                          </p:cTn>
-                        </p:par>
-                      </p:childTnLst>
-                    </p:cTn>
-                  </p:par>
-                  <p:par>
-                    <p:cTn id="19" fill="hold">
-                      <p:stCondLst>
-                        <p:cond delay="indefinite"/>
-                      </p:stCondLst>
-                      <p:childTnLst>
-                        <p:par>
-                          <p:cTn id="20" fill="hold">
-                            <p:stCondLst>
-                              <p:cond delay="0"/>
-                            </p:stCondLst>
-                            <p:childTnLst>
-                              <p:par>
-                                <p:cTn id="21" presetID="1" presetClass="entr" presetSubtype="0" fill="hold" grpId="0" nodeType="clickEffect">
-                                  <p:stCondLst>
-                                    <p:cond delay="0"/>
-                                  </p:stCondLst>
-                                  <p:childTnLst>
-                                    <p:set>
-                                      <p:cBhvr>
-                                        <p:cTn id="22" dur="1" fill="hold">
-                                          <p:stCondLst>
-                                            <p:cond delay="0"/>
-                                          </p:stCondLst>
-                                        </p:cTn>
-                                        <p:tgtEl>
-                                          <p:spTgt spid="3">
-                                            <p:txEl>
-                                              <p:pRg st="5" end="5"/>
-                                            </p:txEl>
-                                          </p:spTgt>
-                                        </p:tgtEl>
-                                        <p:attrNameLst>
-                                          <p:attrName>style.visibility</p:attrName>
-                                        </p:attrNameLst>
-                                      </p:cBhvr>
-                                      <p:to>
-                                        <p:strVal val="visible"/>
-                                      </p:to>
-                                    </p:set>
-                                  </p:childTnLst>
-                                </p:cTn>
-                              </p:par>
-                            </p:childTnLst>
-                          </p:cTn>
-                        </p:par>
-                      </p:childTnLst>
-                    </p:cTn>
-                  </p:par>
-                  <p:par>
-                    <p:cTn id="23" fill="hold">
-                      <p:stCondLst>
-                        <p:cond delay="indefinite"/>
-                      </p:stCondLst>
-                      <p:childTnLst>
-                        <p:par>
-                          <p:cTn id="24" fill="hold">
-                            <p:stCondLst>
-                              <p:cond delay="0"/>
-                            </p:stCondLst>
-                            <p:childTnLst>
-                              <p:par>
-                                <p:cTn id="25" presetID="1" presetClass="entr" presetSubtype="0" fill="hold" grpId="0" nodeType="clickEffect">
-                                  <p:stCondLst>
-                                    <p:cond delay="0"/>
-                                  </p:stCondLst>
-                                  <p:childTnLst>
-                                    <p:set>
-                                      <p:cBhvr>
-                                        <p:cTn id="26" dur="1" fill="hold">
-                                          <p:stCondLst>
-                                            <p:cond delay="0"/>
-                                          </p:stCondLst>
-                                        </p:cTn>
-                                        <p:tgtEl>
-                                          <p:spTgt spid="3">
-                                            <p:txEl>
-                                              <p:pRg st="6" end="6"/>
-                                            </p:txEl>
-                                          </p:spTgt>
-                                        </p:tgtEl>
-                                        <p:attrNameLst>
-                                          <p:attrName>style.visibility</p:attrName>
-                                        </p:attrNameLst>
-                                      </p:cBhvr>
-                                      <p:to>
-                                        <p:strVal val="visible"/>
-                                      </p:to>
-                                    </p:set>
-                                  </p:childTnLst>
-                                </p:cTn>
-                              </p:par>
-                            </p:childTnLst>
-                          </p:cTn>
-                        </p:par>
-                      </p:childTnLst>
-                    </p:cTn>
-                  </p:par>
                 </p:childTnLst>
               </p:cTn>
               <p:prevCondLst>
@@ -15278,9 +15326,442 @@
       </p:par>
     </p:tnLst>
     <p:bldLst>
-      <p:bldP spid="3" grpId="0" uiExpand="1" build="p"/>
+      <p:bldP spid="3" grpId="0" build="p"/>
     </p:bldLst>
   </p:timing>
+</p:sld>
+</file>
+
+<file path=ppt/slides/slide7.xml><?xml version="1.0" encoding="utf-8"?>
+<p:sld xmlns:a="http://schemas.openxmlformats.org/drawingml/2006/main" xmlns:r="http://schemas.openxmlformats.org/officeDocument/2006/relationships" xmlns:p="http://schemas.openxmlformats.org/presentationml/2006/main">
+  <p:cSld>
+    <p:spTree>
+      <p:nvGrpSpPr>
+        <p:cNvPr id="1" name=""/>
+        <p:cNvGrpSpPr/>
+        <p:nvPr/>
+      </p:nvGrpSpPr>
+      <p:grpSpPr>
+        <a:xfrm>
+          <a:off x="0" y="0"/>
+          <a:ext cx="0" cy="0"/>
+          <a:chOff x="0" y="0"/>
+          <a:chExt cx="0" cy="0"/>
+        </a:xfrm>
+      </p:grpSpPr>
+      <p:sp>
+        <p:nvSpPr>
+          <p:cNvPr id="2" name="Title 1">
+            <a:extLst>
+              <a:ext uri="{FF2B5EF4-FFF2-40B4-BE49-F238E27FC236}">
+                <a16:creationId xmlns:a16="http://schemas.microsoft.com/office/drawing/2014/main" id="{EA11EC8D-13CE-4510-9934-DAC95064048B}"/>
+              </a:ext>
+            </a:extLst>
+          </p:cNvPr>
+          <p:cNvSpPr>
+            <a:spLocks noGrp="1"/>
+          </p:cNvSpPr>
+          <p:nvPr>
+            <p:ph type="title"/>
+          </p:nvPr>
+        </p:nvSpPr>
+        <p:spPr/>
+        <p:txBody>
+          <a:bodyPr/>
+          <a:lstStyle/>
+          <a:p>
+            <a:r>
+              <a:rPr lang="en-US" dirty="0"/>
+              <a:t>Why Apps in </a:t>
+            </a:r>
+            <a:r>
+              <a:rPr lang="en-US" dirty="0" err="1"/>
+              <a:t>Blazor</a:t>
+            </a:r>
+            <a:r>
+              <a:rPr lang="en-US" dirty="0"/>
+              <a:t>?</a:t>
+            </a:r>
+            <a:endParaRPr lang="sk-SK" dirty="0"/>
+          </a:p>
+        </p:txBody>
+      </p:sp>
+      <p:sp>
+        <p:nvSpPr>
+          <p:cNvPr id="3" name="Content Placeholder 2">
+            <a:extLst>
+              <a:ext uri="{FF2B5EF4-FFF2-40B4-BE49-F238E27FC236}">
+                <a16:creationId xmlns:a16="http://schemas.microsoft.com/office/drawing/2014/main" id="{0AEC84CE-ADFE-41FA-AE4D-ED21228A07CF}"/>
+              </a:ext>
+            </a:extLst>
+          </p:cNvPr>
+          <p:cNvSpPr>
+            <a:spLocks noGrp="1"/>
+          </p:cNvSpPr>
+          <p:nvPr>
+            <p:ph idx="1"/>
+          </p:nvPr>
+        </p:nvSpPr>
+        <p:spPr/>
+        <p:txBody>
+          <a:bodyPr>
+            <a:normAutofit/>
+          </a:bodyPr>
+          <a:lstStyle/>
+          <a:p>
+            <a:r>
+              <a:rPr lang="en-US" dirty="0" err="1"/>
+              <a:t>Blazor</a:t>
+            </a:r>
+            <a:r>
+              <a:rPr lang="en-US" dirty="0"/>
+              <a:t> Cons:</a:t>
+            </a:r>
+          </a:p>
+          <a:p>
+            <a:pPr lvl="1"/>
+            <a:r>
+              <a:rPr lang="en-US" dirty="0"/>
+              <a:t>Bigger size on first page load</a:t>
+            </a:r>
+          </a:p>
+          <a:p>
+            <a:pPr lvl="1"/>
+            <a:r>
+              <a:rPr lang="en-US" dirty="0"/>
+              <a:t>Uses client’s computing power</a:t>
+            </a:r>
+          </a:p>
+          <a:p>
+            <a:pPr lvl="1"/>
+            <a:r>
+              <a:rPr lang="en-US" dirty="0"/>
+              <a:t>It is on the client – no direct database connection</a:t>
+            </a:r>
+          </a:p>
+          <a:p>
+            <a:pPr lvl="1"/>
+            <a:r>
+              <a:rPr lang="en-US" dirty="0"/>
+              <a:t>Usually communicates with an API</a:t>
+            </a:r>
+          </a:p>
+          <a:p>
+            <a:r>
+              <a:rPr lang="en-US" dirty="0" err="1"/>
+              <a:t>Blazor</a:t>
+            </a:r>
+            <a:r>
+              <a:rPr lang="en-US" dirty="0"/>
+              <a:t> Pros:</a:t>
+            </a:r>
+          </a:p>
+          <a:p>
+            <a:pPr lvl="1"/>
+            <a:r>
+              <a:rPr lang="en-US" dirty="0"/>
+              <a:t>Runs on client</a:t>
+            </a:r>
+          </a:p>
+          <a:p>
+            <a:pPr lvl="1"/>
+            <a:r>
+              <a:rPr lang="en-US" dirty="0"/>
+              <a:t>Doesn’t need server after first load</a:t>
+            </a:r>
+          </a:p>
+          <a:p>
+            <a:pPr lvl="1"/>
+            <a:r>
+              <a:rPr lang="en-US" dirty="0"/>
+              <a:t>Runs alongside JavaScript</a:t>
+            </a:r>
+          </a:p>
+          <a:p>
+            <a:pPr lvl="1"/>
+            <a:r>
+              <a:rPr lang="en-US" dirty="0"/>
+              <a:t>Can communicate with JavaScript</a:t>
+            </a:r>
+          </a:p>
+          <a:p>
+            <a:pPr lvl="1"/>
+            <a:endParaRPr lang="en-US" dirty="0"/>
+          </a:p>
+        </p:txBody>
+      </p:sp>
+    </p:spTree>
+    <p:extLst>
+      <p:ext uri="{BB962C8B-B14F-4D97-AF65-F5344CB8AC3E}">
+        <p14:creationId xmlns:p14="http://schemas.microsoft.com/office/powerpoint/2010/main" val="3423923341"/>
+      </p:ext>
+    </p:extLst>
+  </p:cSld>
+  <p:clrMapOvr>
+    <a:masterClrMapping/>
+  </p:clrMapOvr>
+  <mc:AlternateContent xmlns:mc="http://schemas.openxmlformats.org/markup-compatibility/2006" xmlns:p14="http://schemas.microsoft.com/office/powerpoint/2010/main">
+    <mc:Choice Requires="p14">
+      <p:transition spd="slow" p14:dur="1600">
+        <p14:prism isInverted="1"/>
+      </p:transition>
+    </mc:Choice>
+    <mc:Fallback xmlns="">
+      <p:transition spd="slow">
+        <p:fade/>
+      </p:transition>
+    </mc:Fallback>
+  </mc:AlternateContent>
+</p:sld>
+</file>
+
+<file path=ppt/slides/slide8.xml><?xml version="1.0" encoding="utf-8"?>
+<p:sld xmlns:a="http://schemas.openxmlformats.org/drawingml/2006/main" xmlns:r="http://schemas.openxmlformats.org/officeDocument/2006/relationships" xmlns:p="http://schemas.openxmlformats.org/presentationml/2006/main">
+  <p:cSld>
+    <p:spTree>
+      <p:nvGrpSpPr>
+        <p:cNvPr id="1" name=""/>
+        <p:cNvGrpSpPr/>
+        <p:nvPr/>
+      </p:nvGrpSpPr>
+      <p:grpSpPr>
+        <a:xfrm>
+          <a:off x="0" y="0"/>
+          <a:ext cx="0" cy="0"/>
+          <a:chOff x="0" y="0"/>
+          <a:chExt cx="0" cy="0"/>
+        </a:xfrm>
+      </p:grpSpPr>
+      <p:sp>
+        <p:nvSpPr>
+          <p:cNvPr id="2" name="Title 1">
+            <a:extLst>
+              <a:ext uri="{FF2B5EF4-FFF2-40B4-BE49-F238E27FC236}">
+                <a16:creationId xmlns:a16="http://schemas.microsoft.com/office/drawing/2014/main" id="{BBE58F59-C8F6-4A9F-855E-ECC1AB47429D}"/>
+              </a:ext>
+            </a:extLst>
+          </p:cNvPr>
+          <p:cNvSpPr>
+            <a:spLocks noGrp="1"/>
+          </p:cNvSpPr>
+          <p:nvPr>
+            <p:ph type="title"/>
+          </p:nvPr>
+        </p:nvSpPr>
+        <p:spPr/>
+        <p:txBody>
+          <a:bodyPr/>
+          <a:lstStyle/>
+          <a:p>
+            <a:r>
+              <a:rPr lang="en-US" dirty="0"/>
+              <a:t>Local storage</a:t>
+            </a:r>
+            <a:endParaRPr lang="sk-SK" dirty="0"/>
+          </a:p>
+        </p:txBody>
+      </p:sp>
+      <p:sp>
+        <p:nvSpPr>
+          <p:cNvPr id="3" name="Content Placeholder 2">
+            <a:extLst>
+              <a:ext uri="{FF2B5EF4-FFF2-40B4-BE49-F238E27FC236}">
+                <a16:creationId xmlns:a16="http://schemas.microsoft.com/office/drawing/2014/main" id="{A8A96B8B-2D53-4BD6-AC2D-B9C580B2E81A}"/>
+              </a:ext>
+            </a:extLst>
+          </p:cNvPr>
+          <p:cNvSpPr>
+            <a:spLocks noGrp="1"/>
+          </p:cNvSpPr>
+          <p:nvPr>
+            <p:ph idx="1"/>
+          </p:nvPr>
+        </p:nvSpPr>
+        <p:spPr/>
+        <p:txBody>
+          <a:bodyPr/>
+          <a:lstStyle/>
+          <a:p>
+            <a:r>
+              <a:rPr lang="en-US" dirty="0"/>
+              <a:t>No expiration date</a:t>
+            </a:r>
+          </a:p>
+          <a:p>
+            <a:r>
+              <a:rPr lang="en-US" dirty="0"/>
+              <a:t>Key-value storage for strings</a:t>
+            </a:r>
+          </a:p>
+          <a:p>
+            <a:r>
+              <a:rPr lang="en-US" dirty="0"/>
+              <a:t>About 5MB limit</a:t>
+            </a:r>
+          </a:p>
+          <a:p>
+            <a:endParaRPr lang="en-US" dirty="0"/>
+          </a:p>
+          <a:p>
+            <a:r>
+              <a:rPr lang="en-US" dirty="0"/>
+              <a:t>Not accessible from service worker</a:t>
+            </a:r>
+          </a:p>
+          <a:p>
+            <a:endParaRPr lang="sk-SK" dirty="0"/>
+          </a:p>
+        </p:txBody>
+      </p:sp>
+    </p:spTree>
+    <p:extLst>
+      <p:ext uri="{BB962C8B-B14F-4D97-AF65-F5344CB8AC3E}">
+        <p14:creationId xmlns:p14="http://schemas.microsoft.com/office/powerpoint/2010/main" val="3933944259"/>
+      </p:ext>
+    </p:extLst>
+  </p:cSld>
+  <p:clrMapOvr>
+    <a:masterClrMapping/>
+  </p:clrMapOvr>
+  <mc:AlternateContent xmlns:mc="http://schemas.openxmlformats.org/markup-compatibility/2006" xmlns:p14="http://schemas.microsoft.com/office/powerpoint/2010/main">
+    <mc:Choice Requires="p14">
+      <p:transition spd="slow" p14:dur="1600">
+        <p14:prism isInverted="1"/>
+      </p:transition>
+    </mc:Choice>
+    <mc:Fallback xmlns="">
+      <p:transition spd="slow">
+        <p:fade/>
+      </p:transition>
+    </mc:Fallback>
+  </mc:AlternateContent>
+</p:sld>
+</file>
+
+<file path=ppt/slides/slide9.xml><?xml version="1.0" encoding="utf-8"?>
+<p:sld xmlns:a="http://schemas.openxmlformats.org/drawingml/2006/main" xmlns:r="http://schemas.openxmlformats.org/officeDocument/2006/relationships" xmlns:p="http://schemas.openxmlformats.org/presentationml/2006/main">
+  <p:cSld>
+    <p:spTree>
+      <p:nvGrpSpPr>
+        <p:cNvPr id="1" name=""/>
+        <p:cNvGrpSpPr/>
+        <p:nvPr/>
+      </p:nvGrpSpPr>
+      <p:grpSpPr>
+        <a:xfrm>
+          <a:off x="0" y="0"/>
+          <a:ext cx="0" cy="0"/>
+          <a:chOff x="0" y="0"/>
+          <a:chExt cx="0" cy="0"/>
+        </a:xfrm>
+      </p:grpSpPr>
+      <p:sp>
+        <p:nvSpPr>
+          <p:cNvPr id="2" name="Title 1">
+            <a:extLst>
+              <a:ext uri="{FF2B5EF4-FFF2-40B4-BE49-F238E27FC236}">
+                <a16:creationId xmlns:a16="http://schemas.microsoft.com/office/drawing/2014/main" id="{C50C6A3C-05C2-418D-8C6E-126AD8203F29}"/>
+              </a:ext>
+            </a:extLst>
+          </p:cNvPr>
+          <p:cNvSpPr>
+            <a:spLocks noGrp="1"/>
+          </p:cNvSpPr>
+          <p:nvPr>
+            <p:ph type="title"/>
+          </p:nvPr>
+        </p:nvSpPr>
+        <p:spPr/>
+        <p:txBody>
+          <a:bodyPr/>
+          <a:lstStyle/>
+          <a:p>
+            <a:r>
+              <a:rPr lang="en-US" dirty="0"/>
+              <a:t>Sync When Online</a:t>
+            </a:r>
+            <a:endParaRPr lang="sk-SK" dirty="0"/>
+          </a:p>
+        </p:txBody>
+      </p:sp>
+      <p:sp>
+        <p:nvSpPr>
+          <p:cNvPr id="3" name="Content Placeholder 2">
+            <a:extLst>
+              <a:ext uri="{FF2B5EF4-FFF2-40B4-BE49-F238E27FC236}">
+                <a16:creationId xmlns:a16="http://schemas.microsoft.com/office/drawing/2014/main" id="{BC78D0D2-0DB6-4136-B120-8F99D1459EB7}"/>
+              </a:ext>
+            </a:extLst>
+          </p:cNvPr>
+          <p:cNvSpPr>
+            <a:spLocks noGrp="1"/>
+          </p:cNvSpPr>
+          <p:nvPr>
+            <p:ph idx="1"/>
+          </p:nvPr>
+        </p:nvSpPr>
+        <p:spPr/>
+        <p:txBody>
+          <a:bodyPr/>
+          <a:lstStyle/>
+          <a:p>
+            <a:r>
+              <a:rPr lang="en-US" dirty="0"/>
+              <a:t>Detect when the web goes online/offline</a:t>
+            </a:r>
+          </a:p>
+          <a:p>
+            <a:pPr lvl="1"/>
+            <a:r>
+              <a:rPr lang="en-US" dirty="0"/>
+              <a:t>JavaScript - </a:t>
+            </a:r>
+            <a:r>
+              <a:rPr lang="en-US" dirty="0" err="1"/>
+              <a:t>navigator.online</a:t>
+            </a:r>
+            <a:endParaRPr lang="en-US" dirty="0"/>
+          </a:p>
+          <a:p>
+            <a:r>
+              <a:rPr lang="en-US" dirty="0"/>
+              <a:t>Sync local data with server</a:t>
+            </a:r>
+          </a:p>
+          <a:p>
+            <a:pPr lvl="1"/>
+            <a:r>
+              <a:rPr lang="en-US" dirty="0"/>
+              <a:t>Logic depends on application</a:t>
+            </a:r>
+          </a:p>
+          <a:p>
+            <a:endParaRPr lang="sk-SK" dirty="0"/>
+          </a:p>
+        </p:txBody>
+      </p:sp>
+    </p:spTree>
+    <p:extLst>
+      <p:ext uri="{BB962C8B-B14F-4D97-AF65-F5344CB8AC3E}">
+        <p14:creationId xmlns:p14="http://schemas.microsoft.com/office/powerpoint/2010/main" val="1552261157"/>
+      </p:ext>
+    </p:extLst>
+  </p:cSld>
+  <p:clrMapOvr>
+    <a:masterClrMapping/>
+  </p:clrMapOvr>
+  <mc:AlternateContent xmlns:mc="http://schemas.openxmlformats.org/markup-compatibility/2006" xmlns:p14="http://schemas.microsoft.com/office/powerpoint/2010/main">
+    <mc:Choice Requires="p14">
+      <p:transition spd="slow" p14:dur="1600">
+        <p14:prism isInverted="1"/>
+      </p:transition>
+    </mc:Choice>
+    <mc:Fallback xmlns="">
+      <p:transition spd="slow">
+        <p:fade/>
+      </p:transition>
+    </mc:Fallback>
+  </mc:AlternateContent>
 </p:sld>
 </file>
 

</xml_diff>